<commit_message>
minor Process Book update
</commit_message>
<xml_diff>
--- a/Process Book.pptx
+++ b/Process Book.pptx
@@ -6,19 +6,20 @@
   </p:sldMasterIdLst>
   <p:sldIdLst>
     <p:sldId id="256" r:id="rId2"/>
-    <p:sldId id="257" r:id="rId3"/>
-    <p:sldId id="258" r:id="rId4"/>
-    <p:sldId id="259" r:id="rId5"/>
-    <p:sldId id="260" r:id="rId6"/>
-    <p:sldId id="261" r:id="rId7"/>
-    <p:sldId id="262" r:id="rId8"/>
-    <p:sldId id="263" r:id="rId9"/>
-    <p:sldId id="264" r:id="rId10"/>
-    <p:sldId id="265" r:id="rId11"/>
-    <p:sldId id="266" r:id="rId12"/>
-    <p:sldId id="267" r:id="rId13"/>
-    <p:sldId id="268" r:id="rId14"/>
-    <p:sldId id="269" r:id="rId15"/>
+    <p:sldId id="270" r:id="rId3"/>
+    <p:sldId id="257" r:id="rId4"/>
+    <p:sldId id="258" r:id="rId5"/>
+    <p:sldId id="259" r:id="rId6"/>
+    <p:sldId id="260" r:id="rId7"/>
+    <p:sldId id="261" r:id="rId8"/>
+    <p:sldId id="262" r:id="rId9"/>
+    <p:sldId id="263" r:id="rId10"/>
+    <p:sldId id="264" r:id="rId11"/>
+    <p:sldId id="265" r:id="rId12"/>
+    <p:sldId id="266" r:id="rId13"/>
+    <p:sldId id="267" r:id="rId14"/>
+    <p:sldId id="268" r:id="rId15"/>
+    <p:sldId id="269" r:id="rId16"/>
   </p:sldIdLst>
   <p:sldSz cx="12192000" cy="6858000"/>
   <p:notesSz cx="6858000" cy="9144000"/>
@@ -5580,7 +5581,7 @@
           <p:cNvPr id="2" name="Title 1">
             <a:extLst>
               <a:ext uri="{FF2B5EF4-FFF2-40B4-BE49-F238E27FC236}">
-                <a16:creationId xmlns:a16="http://schemas.microsoft.com/office/drawing/2014/main" id="{30F87055-3A2D-45C7-B585-76CCE58521DA}"/>
+                <a16:creationId xmlns:a16="http://schemas.microsoft.com/office/drawing/2014/main" id="{8EB4C81B-025B-40D9-A028-0D7E404FAB8C}"/>
               </a:ext>
             </a:extLst>
           </p:cNvPr>
@@ -5598,7 +5599,7 @@
           <a:p>
             <a:r>
               <a:rPr lang="en-US" dirty="0"/>
-              <a:t>Carousal</a:t>
+              <a:t>Proposal vs Final Product</a:t>
             </a:r>
           </a:p>
         </p:txBody>
@@ -5608,7 +5609,7 @@
           <p:cNvPr id="3" name="Content Placeholder 2">
             <a:extLst>
               <a:ext uri="{FF2B5EF4-FFF2-40B4-BE49-F238E27FC236}">
-                <a16:creationId xmlns:a16="http://schemas.microsoft.com/office/drawing/2014/main" id="{D5C48A13-36D5-425C-BBF7-C0657FD77440}"/>
+                <a16:creationId xmlns:a16="http://schemas.microsoft.com/office/drawing/2014/main" id="{ABD72DB9-1801-4EE3-9313-6408A8E7FC52}"/>
               </a:ext>
             </a:extLst>
           </p:cNvPr>
@@ -5631,7 +5632,7 @@
     </p:spTree>
     <p:extLst>
       <p:ext uri="{BB962C8B-B14F-4D97-AF65-F5344CB8AC3E}">
-        <p14:creationId xmlns:p14="http://schemas.microsoft.com/office/powerpoint/2010/main" val="1010810322"/>
+        <p14:creationId xmlns:p14="http://schemas.microsoft.com/office/powerpoint/2010/main" val="1867345536"/>
       </p:ext>
     </p:extLst>
   </p:cSld>
@@ -5663,7 +5664,7 @@
           <p:cNvPr id="2" name="Title 1">
             <a:extLst>
               <a:ext uri="{FF2B5EF4-FFF2-40B4-BE49-F238E27FC236}">
-                <a16:creationId xmlns:a16="http://schemas.microsoft.com/office/drawing/2014/main" id="{1053ACBF-A3CA-49D1-B521-2ADE1C5B021B}"/>
+                <a16:creationId xmlns:a16="http://schemas.microsoft.com/office/drawing/2014/main" id="{30F87055-3A2D-45C7-B585-76CCE58521DA}"/>
               </a:ext>
             </a:extLst>
           </p:cNvPr>
@@ -5681,7 +5682,7 @@
           <a:p>
             <a:r>
               <a:rPr lang="en-US" dirty="0"/>
-              <a:t>Small Multiples</a:t>
+              <a:t>Carousal</a:t>
             </a:r>
           </a:p>
         </p:txBody>
@@ -5691,7 +5692,7 @@
           <p:cNvPr id="3" name="Content Placeholder 2">
             <a:extLst>
               <a:ext uri="{FF2B5EF4-FFF2-40B4-BE49-F238E27FC236}">
-                <a16:creationId xmlns:a16="http://schemas.microsoft.com/office/drawing/2014/main" id="{D5BADCFF-05A9-4C9A-9FF4-ECC7DF70CC75}"/>
+                <a16:creationId xmlns:a16="http://schemas.microsoft.com/office/drawing/2014/main" id="{D5C48A13-36D5-425C-BBF7-C0657FD77440}"/>
               </a:ext>
             </a:extLst>
           </p:cNvPr>
@@ -5714,7 +5715,7 @@
     </p:spTree>
     <p:extLst>
       <p:ext uri="{BB962C8B-B14F-4D97-AF65-F5344CB8AC3E}">
-        <p14:creationId xmlns:p14="http://schemas.microsoft.com/office/powerpoint/2010/main" val="1545611829"/>
+        <p14:creationId xmlns:p14="http://schemas.microsoft.com/office/powerpoint/2010/main" val="1010810322"/>
       </p:ext>
     </p:extLst>
   </p:cSld>
@@ -5746,7 +5747,7 @@
           <p:cNvPr id="2" name="Title 1">
             <a:extLst>
               <a:ext uri="{FF2B5EF4-FFF2-40B4-BE49-F238E27FC236}">
-                <a16:creationId xmlns:a16="http://schemas.microsoft.com/office/drawing/2014/main" id="{432E8306-75FE-4016-8F3F-5587ACCFD21F}"/>
+                <a16:creationId xmlns:a16="http://schemas.microsoft.com/office/drawing/2014/main" id="{1053ACBF-A3CA-49D1-B521-2ADE1C5B021B}"/>
               </a:ext>
             </a:extLst>
           </p:cNvPr>
@@ -5764,7 +5765,7 @@
           <a:p>
             <a:r>
               <a:rPr lang="en-US" dirty="0"/>
-              <a:t>Map</a:t>
+              <a:t>Small Multiples</a:t>
             </a:r>
           </a:p>
         </p:txBody>
@@ -5774,7 +5775,7 @@
           <p:cNvPr id="3" name="Content Placeholder 2">
             <a:extLst>
               <a:ext uri="{FF2B5EF4-FFF2-40B4-BE49-F238E27FC236}">
-                <a16:creationId xmlns:a16="http://schemas.microsoft.com/office/drawing/2014/main" id="{312AD494-2362-4556-9639-D85B22F04558}"/>
+                <a16:creationId xmlns:a16="http://schemas.microsoft.com/office/drawing/2014/main" id="{D5BADCFF-05A9-4C9A-9FF4-ECC7DF70CC75}"/>
               </a:ext>
             </a:extLst>
           </p:cNvPr>
@@ -5797,7 +5798,7 @@
     </p:spTree>
     <p:extLst>
       <p:ext uri="{BB962C8B-B14F-4D97-AF65-F5344CB8AC3E}">
-        <p14:creationId xmlns:p14="http://schemas.microsoft.com/office/powerpoint/2010/main" val="1838711979"/>
+        <p14:creationId xmlns:p14="http://schemas.microsoft.com/office/powerpoint/2010/main" val="1545611829"/>
       </p:ext>
     </p:extLst>
   </p:cSld>
@@ -5829,7 +5830,7 @@
           <p:cNvPr id="2" name="Title 1">
             <a:extLst>
               <a:ext uri="{FF2B5EF4-FFF2-40B4-BE49-F238E27FC236}">
-                <a16:creationId xmlns:a16="http://schemas.microsoft.com/office/drawing/2014/main" id="{253639B2-AD0E-4DAB-AA92-BC65B900EAA3}"/>
+                <a16:creationId xmlns:a16="http://schemas.microsoft.com/office/drawing/2014/main" id="{432E8306-75FE-4016-8F3F-5587ACCFD21F}"/>
               </a:ext>
             </a:extLst>
           </p:cNvPr>
@@ -5847,7 +5848,7 @@
           <a:p>
             <a:r>
               <a:rPr lang="en-US" dirty="0"/>
-              <a:t>Results</a:t>
+              <a:t>Map</a:t>
             </a:r>
           </a:p>
         </p:txBody>
@@ -5857,7 +5858,7 @@
           <p:cNvPr id="3" name="Content Placeholder 2">
             <a:extLst>
               <a:ext uri="{FF2B5EF4-FFF2-40B4-BE49-F238E27FC236}">
-                <a16:creationId xmlns:a16="http://schemas.microsoft.com/office/drawing/2014/main" id="{F068BB29-8E17-4B17-B606-B6E99301FCF5}"/>
+                <a16:creationId xmlns:a16="http://schemas.microsoft.com/office/drawing/2014/main" id="{312AD494-2362-4556-9639-D85B22F04558}"/>
               </a:ext>
             </a:extLst>
           </p:cNvPr>
@@ -5880,7 +5881,7 @@
     </p:spTree>
     <p:extLst>
       <p:ext uri="{BB962C8B-B14F-4D97-AF65-F5344CB8AC3E}">
-        <p14:creationId xmlns:p14="http://schemas.microsoft.com/office/powerpoint/2010/main" val="660369293"/>
+        <p14:creationId xmlns:p14="http://schemas.microsoft.com/office/powerpoint/2010/main" val="1838711979"/>
       </p:ext>
     </p:extLst>
   </p:cSld>
@@ -5912,6 +5913,89 @@
           <p:cNvPr id="2" name="Title 1">
             <a:extLst>
               <a:ext uri="{FF2B5EF4-FFF2-40B4-BE49-F238E27FC236}">
+                <a16:creationId xmlns:a16="http://schemas.microsoft.com/office/drawing/2014/main" id="{253639B2-AD0E-4DAB-AA92-BC65B900EAA3}"/>
+              </a:ext>
+            </a:extLst>
+          </p:cNvPr>
+          <p:cNvSpPr>
+            <a:spLocks noGrp="1"/>
+          </p:cNvSpPr>
+          <p:nvPr>
+            <p:ph type="title"/>
+          </p:nvPr>
+        </p:nvSpPr>
+        <p:spPr/>
+        <p:txBody>
+          <a:bodyPr/>
+          <a:lstStyle/>
+          <a:p>
+            <a:r>
+              <a:rPr lang="en-US" dirty="0"/>
+              <a:t>Results</a:t>
+            </a:r>
+          </a:p>
+        </p:txBody>
+      </p:sp>
+      <p:sp>
+        <p:nvSpPr>
+          <p:cNvPr id="3" name="Content Placeholder 2">
+            <a:extLst>
+              <a:ext uri="{FF2B5EF4-FFF2-40B4-BE49-F238E27FC236}">
+                <a16:creationId xmlns:a16="http://schemas.microsoft.com/office/drawing/2014/main" id="{F068BB29-8E17-4B17-B606-B6E99301FCF5}"/>
+              </a:ext>
+            </a:extLst>
+          </p:cNvPr>
+          <p:cNvSpPr>
+            <a:spLocks noGrp="1"/>
+          </p:cNvSpPr>
+          <p:nvPr>
+            <p:ph idx="1"/>
+          </p:nvPr>
+        </p:nvSpPr>
+        <p:spPr/>
+        <p:txBody>
+          <a:bodyPr/>
+          <a:lstStyle/>
+          <a:p>
+            <a:endParaRPr lang="en-US"/>
+          </a:p>
+        </p:txBody>
+      </p:sp>
+    </p:spTree>
+    <p:extLst>
+      <p:ext uri="{BB962C8B-B14F-4D97-AF65-F5344CB8AC3E}">
+        <p14:creationId xmlns:p14="http://schemas.microsoft.com/office/powerpoint/2010/main" val="660369293"/>
+      </p:ext>
+    </p:extLst>
+  </p:cSld>
+  <p:clrMapOvr>
+    <a:masterClrMapping/>
+  </p:clrMapOvr>
+</p:sld>
+</file>
+
+<file path=ppt/slides/slide15.xml><?xml version="1.0" encoding="utf-8"?>
+<p:sld xmlns:a="http://schemas.openxmlformats.org/drawingml/2006/main" xmlns:r="http://schemas.openxmlformats.org/officeDocument/2006/relationships" xmlns:p="http://schemas.openxmlformats.org/presentationml/2006/main">
+  <p:cSld>
+    <p:spTree>
+      <p:nvGrpSpPr>
+        <p:cNvPr id="1" name=""/>
+        <p:cNvGrpSpPr/>
+        <p:nvPr/>
+      </p:nvGrpSpPr>
+      <p:grpSpPr>
+        <a:xfrm>
+          <a:off x="0" y="0"/>
+          <a:ext cx="0" cy="0"/>
+          <a:chOff x="0" y="0"/>
+          <a:chExt cx="0" cy="0"/>
+        </a:xfrm>
+      </p:grpSpPr>
+      <p:sp>
+        <p:nvSpPr>
+          <p:cNvPr id="2" name="Title 1">
+            <a:extLst>
+              <a:ext uri="{FF2B5EF4-FFF2-40B4-BE49-F238E27FC236}">
                 <a16:creationId xmlns:a16="http://schemas.microsoft.com/office/drawing/2014/main" id="{937EDCB8-5374-4D5E-BDDC-FB0EDF0D4AEA}"/>
               </a:ext>
             </a:extLst>
@@ -5930,38 +6014,33 @@
           <a:p>
             <a:r>
               <a:rPr lang="en-US" dirty="0"/>
-              <a:t>Future </a:t>
-            </a:r>
-            <a:r>
-              <a:rPr lang="en-US" dirty="0" err="1"/>
-              <a:t>Improvments</a:t>
-            </a:r>
+              <a:t>Future Improvements</a:t>
+            </a:r>
+          </a:p>
+        </p:txBody>
+      </p:sp>
+      <p:sp>
+        <p:nvSpPr>
+          <p:cNvPr id="3" name="Content Placeholder 2">
+            <a:extLst>
+              <a:ext uri="{FF2B5EF4-FFF2-40B4-BE49-F238E27FC236}">
+                <a16:creationId xmlns:a16="http://schemas.microsoft.com/office/drawing/2014/main" id="{AA9065FF-F38D-428A-9913-3F020E6C6E48}"/>
+              </a:ext>
+            </a:extLst>
+          </p:cNvPr>
+          <p:cNvSpPr>
+            <a:spLocks noGrp="1"/>
+          </p:cNvSpPr>
+          <p:nvPr>
+            <p:ph idx="1"/>
+          </p:nvPr>
+        </p:nvSpPr>
+        <p:spPr/>
+        <p:txBody>
+          <a:bodyPr/>
+          <a:lstStyle/>
+          <a:p>
             <a:endParaRPr lang="en-US" dirty="0"/>
-          </a:p>
-        </p:txBody>
-      </p:sp>
-      <p:sp>
-        <p:nvSpPr>
-          <p:cNvPr id="3" name="Content Placeholder 2">
-            <a:extLst>
-              <a:ext uri="{FF2B5EF4-FFF2-40B4-BE49-F238E27FC236}">
-                <a16:creationId xmlns:a16="http://schemas.microsoft.com/office/drawing/2014/main" id="{AA9065FF-F38D-428A-9913-3F020E6C6E48}"/>
-              </a:ext>
-            </a:extLst>
-          </p:cNvPr>
-          <p:cNvSpPr>
-            <a:spLocks noGrp="1"/>
-          </p:cNvSpPr>
-          <p:nvPr>
-            <p:ph idx="1"/>
-          </p:nvPr>
-        </p:nvSpPr>
-        <p:spPr/>
-        <p:txBody>
-          <a:bodyPr/>
-          <a:lstStyle/>
-          <a:p>
-            <a:endParaRPr lang="en-US"/>
           </a:p>
         </p:txBody>
       </p:sp>
@@ -6000,7 +6079,7 @@
           <p:cNvPr id="2" name="Title 1">
             <a:extLst>
               <a:ext uri="{FF2B5EF4-FFF2-40B4-BE49-F238E27FC236}">
-                <a16:creationId xmlns:a16="http://schemas.microsoft.com/office/drawing/2014/main" id="{3A342A7B-BB3C-4CC3-8705-F3C5B298725C}"/>
+                <a16:creationId xmlns:a16="http://schemas.microsoft.com/office/drawing/2014/main" id="{525EB018-0C9F-442F-94D1-D40CA4401664}"/>
               </a:ext>
             </a:extLst>
           </p:cNvPr>
@@ -6017,8 +6096,8 @@
           <a:lstStyle/>
           <a:p>
             <a:r>
-              <a:rPr lang="en-US" dirty="0"/>
-              <a:t>Project Goals</a:t>
+              <a:rPr lang="en-US"/>
+              <a:t>Introduction</a:t>
             </a:r>
           </a:p>
         </p:txBody>
@@ -6028,7 +6107,7 @@
           <p:cNvPr id="3" name="Content Placeholder 2">
             <a:extLst>
               <a:ext uri="{FF2B5EF4-FFF2-40B4-BE49-F238E27FC236}">
-                <a16:creationId xmlns:a16="http://schemas.microsoft.com/office/drawing/2014/main" id="{11ADF879-7A29-43D1-83A1-3D6B950F9E04}"/>
+                <a16:creationId xmlns:a16="http://schemas.microsoft.com/office/drawing/2014/main" id="{D52B5B06-FA53-4D27-8221-F953911E8DFB}"/>
               </a:ext>
             </a:extLst>
           </p:cNvPr>
@@ -6051,7 +6130,7 @@
     </p:spTree>
     <p:extLst>
       <p:ext uri="{BB962C8B-B14F-4D97-AF65-F5344CB8AC3E}">
-        <p14:creationId xmlns:p14="http://schemas.microsoft.com/office/powerpoint/2010/main" val="4028198806"/>
+        <p14:creationId xmlns:p14="http://schemas.microsoft.com/office/powerpoint/2010/main" val="4203160364"/>
       </p:ext>
     </p:extLst>
   </p:cSld>
@@ -6083,7 +6162,7 @@
           <p:cNvPr id="2" name="Title 1">
             <a:extLst>
               <a:ext uri="{FF2B5EF4-FFF2-40B4-BE49-F238E27FC236}">
-                <a16:creationId xmlns:a16="http://schemas.microsoft.com/office/drawing/2014/main" id="{867F28B5-061A-4D3A-827C-D1BF6F650A7F}"/>
+                <a16:creationId xmlns:a16="http://schemas.microsoft.com/office/drawing/2014/main" id="{3A342A7B-BB3C-4CC3-8705-F3C5B298725C}"/>
               </a:ext>
             </a:extLst>
           </p:cNvPr>
@@ -6101,7 +6180,7 @@
           <a:p>
             <a:r>
               <a:rPr lang="en-US" dirty="0"/>
-              <a:t>Motivation</a:t>
+              <a:t>Project Goals</a:t>
             </a:r>
           </a:p>
         </p:txBody>
@@ -6111,7 +6190,7 @@
           <p:cNvPr id="3" name="Content Placeholder 2">
             <a:extLst>
               <a:ext uri="{FF2B5EF4-FFF2-40B4-BE49-F238E27FC236}">
-                <a16:creationId xmlns:a16="http://schemas.microsoft.com/office/drawing/2014/main" id="{6DB4EACC-54F9-470E-84D2-6F4AFDDD3007}"/>
+                <a16:creationId xmlns:a16="http://schemas.microsoft.com/office/drawing/2014/main" id="{11ADF879-7A29-43D1-83A1-3D6B950F9E04}"/>
               </a:ext>
             </a:extLst>
           </p:cNvPr>
@@ -6134,7 +6213,7 @@
     </p:spTree>
     <p:extLst>
       <p:ext uri="{BB962C8B-B14F-4D97-AF65-F5344CB8AC3E}">
-        <p14:creationId xmlns:p14="http://schemas.microsoft.com/office/powerpoint/2010/main" val="2661754414"/>
+        <p14:creationId xmlns:p14="http://schemas.microsoft.com/office/powerpoint/2010/main" val="4028198806"/>
       </p:ext>
     </p:extLst>
   </p:cSld>
@@ -6166,7 +6245,7 @@
           <p:cNvPr id="2" name="Title 1">
             <a:extLst>
               <a:ext uri="{FF2B5EF4-FFF2-40B4-BE49-F238E27FC236}">
-                <a16:creationId xmlns:a16="http://schemas.microsoft.com/office/drawing/2014/main" id="{C44B6315-360A-4B39-8CF6-507340CE31BC}"/>
+                <a16:creationId xmlns:a16="http://schemas.microsoft.com/office/drawing/2014/main" id="{867F28B5-061A-4D3A-827C-D1BF6F650A7F}"/>
               </a:ext>
             </a:extLst>
           </p:cNvPr>
@@ -6183,10 +6262,9 @@
           <a:lstStyle/>
           <a:p>
             <a:r>
-              <a:rPr lang="en-US" dirty="0" err="1"/>
-              <a:t>Inspriation</a:t>
-            </a:r>
-            <a:endParaRPr lang="en-US" dirty="0"/>
+              <a:rPr lang="en-US" dirty="0"/>
+              <a:t>Motivation</a:t>
+            </a:r>
           </a:p>
         </p:txBody>
       </p:sp>
@@ -6195,7 +6273,7 @@
           <p:cNvPr id="3" name="Content Placeholder 2">
             <a:extLst>
               <a:ext uri="{FF2B5EF4-FFF2-40B4-BE49-F238E27FC236}">
-                <a16:creationId xmlns:a16="http://schemas.microsoft.com/office/drawing/2014/main" id="{A0E3C2DD-7979-4F81-809B-54049B1A4166}"/>
+                <a16:creationId xmlns:a16="http://schemas.microsoft.com/office/drawing/2014/main" id="{6DB4EACC-54F9-470E-84D2-6F4AFDDD3007}"/>
               </a:ext>
             </a:extLst>
           </p:cNvPr>
@@ -6218,7 +6296,7 @@
     </p:spTree>
     <p:extLst>
       <p:ext uri="{BB962C8B-B14F-4D97-AF65-F5344CB8AC3E}">
-        <p14:creationId xmlns:p14="http://schemas.microsoft.com/office/powerpoint/2010/main" val="4110311276"/>
+        <p14:creationId xmlns:p14="http://schemas.microsoft.com/office/powerpoint/2010/main" val="2661754414"/>
       </p:ext>
     </p:extLst>
   </p:cSld>
@@ -6250,7 +6328,7 @@
           <p:cNvPr id="2" name="Title 1">
             <a:extLst>
               <a:ext uri="{FF2B5EF4-FFF2-40B4-BE49-F238E27FC236}">
-                <a16:creationId xmlns:a16="http://schemas.microsoft.com/office/drawing/2014/main" id="{F34CC2ED-DC7B-4577-80E1-B1AB1CCAE85E}"/>
+                <a16:creationId xmlns:a16="http://schemas.microsoft.com/office/drawing/2014/main" id="{C44B6315-360A-4B39-8CF6-507340CE31BC}"/>
               </a:ext>
             </a:extLst>
           </p:cNvPr>
@@ -6267,9 +6345,10 @@
           <a:lstStyle/>
           <a:p>
             <a:r>
-              <a:rPr lang="en-US" dirty="0"/>
-              <a:t>Our Burning Questions</a:t>
-            </a:r>
+              <a:rPr lang="en-US" dirty="0" err="1"/>
+              <a:t>Inspriation</a:t>
+            </a:r>
+            <a:endParaRPr lang="en-US" dirty="0"/>
           </a:p>
         </p:txBody>
       </p:sp>
@@ -6278,7 +6357,7 @@
           <p:cNvPr id="3" name="Content Placeholder 2">
             <a:extLst>
               <a:ext uri="{FF2B5EF4-FFF2-40B4-BE49-F238E27FC236}">
-                <a16:creationId xmlns:a16="http://schemas.microsoft.com/office/drawing/2014/main" id="{2D1D8441-6483-4C6C-9444-452479AEF30E}"/>
+                <a16:creationId xmlns:a16="http://schemas.microsoft.com/office/drawing/2014/main" id="{A0E3C2DD-7979-4F81-809B-54049B1A4166}"/>
               </a:ext>
             </a:extLst>
           </p:cNvPr>
@@ -6301,7 +6380,7 @@
     </p:spTree>
     <p:extLst>
       <p:ext uri="{BB962C8B-B14F-4D97-AF65-F5344CB8AC3E}">
-        <p14:creationId xmlns:p14="http://schemas.microsoft.com/office/powerpoint/2010/main" val="3786800117"/>
+        <p14:creationId xmlns:p14="http://schemas.microsoft.com/office/powerpoint/2010/main" val="4110311276"/>
       </p:ext>
     </p:extLst>
   </p:cSld>
@@ -6333,7 +6412,7 @@
           <p:cNvPr id="2" name="Title 1">
             <a:extLst>
               <a:ext uri="{FF2B5EF4-FFF2-40B4-BE49-F238E27FC236}">
-                <a16:creationId xmlns:a16="http://schemas.microsoft.com/office/drawing/2014/main" id="{3A1EE396-1C9F-4ED0-8016-278FB58F2F92}"/>
+                <a16:creationId xmlns:a16="http://schemas.microsoft.com/office/drawing/2014/main" id="{F34CC2ED-DC7B-4577-80E1-B1AB1CCAE85E}"/>
               </a:ext>
             </a:extLst>
           </p:cNvPr>
@@ -6351,7 +6430,7 @@
           <a:p>
             <a:r>
               <a:rPr lang="en-US" dirty="0"/>
-              <a:t>Data Processing</a:t>
+              <a:t>Our Burning Questions</a:t>
             </a:r>
           </a:p>
         </p:txBody>
@@ -6361,7 +6440,7 @@
           <p:cNvPr id="3" name="Content Placeholder 2">
             <a:extLst>
               <a:ext uri="{FF2B5EF4-FFF2-40B4-BE49-F238E27FC236}">
-                <a16:creationId xmlns:a16="http://schemas.microsoft.com/office/drawing/2014/main" id="{C4A81D02-636F-415D-90B6-2BD945457647}"/>
+                <a16:creationId xmlns:a16="http://schemas.microsoft.com/office/drawing/2014/main" id="{2D1D8441-6483-4C6C-9444-452479AEF30E}"/>
               </a:ext>
             </a:extLst>
           </p:cNvPr>
@@ -6384,7 +6463,7 @@
     </p:spTree>
     <p:extLst>
       <p:ext uri="{BB962C8B-B14F-4D97-AF65-F5344CB8AC3E}">
-        <p14:creationId xmlns:p14="http://schemas.microsoft.com/office/powerpoint/2010/main" val="2226932869"/>
+        <p14:creationId xmlns:p14="http://schemas.microsoft.com/office/powerpoint/2010/main" val="3786800117"/>
       </p:ext>
     </p:extLst>
   </p:cSld>
@@ -6416,7 +6495,7 @@
           <p:cNvPr id="2" name="Title 1">
             <a:extLst>
               <a:ext uri="{FF2B5EF4-FFF2-40B4-BE49-F238E27FC236}">
-                <a16:creationId xmlns:a16="http://schemas.microsoft.com/office/drawing/2014/main" id="{1212A621-BE1B-405C-B52F-9B90F0F4FE64}"/>
+                <a16:creationId xmlns:a16="http://schemas.microsoft.com/office/drawing/2014/main" id="{3A1EE396-1C9F-4ED0-8016-278FB58F2F92}"/>
               </a:ext>
             </a:extLst>
           </p:cNvPr>
@@ -6434,7 +6513,7 @@
           <a:p>
             <a:r>
               <a:rPr lang="en-US" dirty="0"/>
-              <a:t>Exploratory Data Analysis</a:t>
+              <a:t>Data Processing</a:t>
             </a:r>
           </a:p>
         </p:txBody>
@@ -6444,7 +6523,7 @@
           <p:cNvPr id="3" name="Content Placeholder 2">
             <a:extLst>
               <a:ext uri="{FF2B5EF4-FFF2-40B4-BE49-F238E27FC236}">
-                <a16:creationId xmlns:a16="http://schemas.microsoft.com/office/drawing/2014/main" id="{8AE126F4-B3B1-4832-B2B7-C3426639BEF3}"/>
+                <a16:creationId xmlns:a16="http://schemas.microsoft.com/office/drawing/2014/main" id="{C4A81D02-636F-415D-90B6-2BD945457647}"/>
               </a:ext>
             </a:extLst>
           </p:cNvPr>
@@ -6467,7 +6546,7 @@
     </p:spTree>
     <p:extLst>
       <p:ext uri="{BB962C8B-B14F-4D97-AF65-F5344CB8AC3E}">
-        <p14:creationId xmlns:p14="http://schemas.microsoft.com/office/powerpoint/2010/main" val="3037967945"/>
+        <p14:creationId xmlns:p14="http://schemas.microsoft.com/office/powerpoint/2010/main" val="2226932869"/>
       </p:ext>
     </p:extLst>
   </p:cSld>
@@ -6499,7 +6578,7 @@
           <p:cNvPr id="2" name="Title 1">
             <a:extLst>
               <a:ext uri="{FF2B5EF4-FFF2-40B4-BE49-F238E27FC236}">
-                <a16:creationId xmlns:a16="http://schemas.microsoft.com/office/drawing/2014/main" id="{CEBF0A4C-FF5B-4603-9F58-CBB890B4CD6A}"/>
+                <a16:creationId xmlns:a16="http://schemas.microsoft.com/office/drawing/2014/main" id="{1212A621-BE1B-405C-B52F-9B90F0F4FE64}"/>
               </a:ext>
             </a:extLst>
           </p:cNvPr>
@@ -6517,7 +6596,7 @@
           <a:p>
             <a:r>
               <a:rPr lang="en-US" dirty="0"/>
-              <a:t>Design choices</a:t>
+              <a:t>Exploratory Data Analysis</a:t>
             </a:r>
           </a:p>
         </p:txBody>
@@ -6527,7 +6606,7 @@
           <p:cNvPr id="3" name="Content Placeholder 2">
             <a:extLst>
               <a:ext uri="{FF2B5EF4-FFF2-40B4-BE49-F238E27FC236}">
-                <a16:creationId xmlns:a16="http://schemas.microsoft.com/office/drawing/2014/main" id="{08288829-CD71-43CD-99B2-A14BB5A8FEFA}"/>
+                <a16:creationId xmlns:a16="http://schemas.microsoft.com/office/drawing/2014/main" id="{8AE126F4-B3B1-4832-B2B7-C3426639BEF3}"/>
               </a:ext>
             </a:extLst>
           </p:cNvPr>
@@ -6550,7 +6629,7 @@
     </p:spTree>
     <p:extLst>
       <p:ext uri="{BB962C8B-B14F-4D97-AF65-F5344CB8AC3E}">
-        <p14:creationId xmlns:p14="http://schemas.microsoft.com/office/powerpoint/2010/main" val="2255807264"/>
+        <p14:creationId xmlns:p14="http://schemas.microsoft.com/office/powerpoint/2010/main" val="3037967945"/>
       </p:ext>
     </p:extLst>
   </p:cSld>
@@ -6582,7 +6661,7 @@
           <p:cNvPr id="2" name="Title 1">
             <a:extLst>
               <a:ext uri="{FF2B5EF4-FFF2-40B4-BE49-F238E27FC236}">
-                <a16:creationId xmlns:a16="http://schemas.microsoft.com/office/drawing/2014/main" id="{8EB4C81B-025B-40D9-A028-0D7E404FAB8C}"/>
+                <a16:creationId xmlns:a16="http://schemas.microsoft.com/office/drawing/2014/main" id="{CEBF0A4C-FF5B-4603-9F58-CBB890B4CD6A}"/>
               </a:ext>
             </a:extLst>
           </p:cNvPr>
@@ -6600,7 +6679,7 @@
           <a:p>
             <a:r>
               <a:rPr lang="en-US" dirty="0"/>
-              <a:t>Proposal vs Final Product</a:t>
+              <a:t>Design choices</a:t>
             </a:r>
           </a:p>
         </p:txBody>
@@ -6610,7 +6689,7 @@
           <p:cNvPr id="3" name="Content Placeholder 2">
             <a:extLst>
               <a:ext uri="{FF2B5EF4-FFF2-40B4-BE49-F238E27FC236}">
-                <a16:creationId xmlns:a16="http://schemas.microsoft.com/office/drawing/2014/main" id="{ABD72DB9-1801-4EE3-9313-6408A8E7FC52}"/>
+                <a16:creationId xmlns:a16="http://schemas.microsoft.com/office/drawing/2014/main" id="{08288829-CD71-43CD-99B2-A14BB5A8FEFA}"/>
               </a:ext>
             </a:extLst>
           </p:cNvPr>
@@ -6633,7 +6712,7 @@
     </p:spTree>
     <p:extLst>
       <p:ext uri="{BB962C8B-B14F-4D97-AF65-F5344CB8AC3E}">
-        <p14:creationId xmlns:p14="http://schemas.microsoft.com/office/powerpoint/2010/main" val="1867345536"/>
+        <p14:creationId xmlns:p14="http://schemas.microsoft.com/office/powerpoint/2010/main" val="2255807264"/>
       </p:ext>
     </p:extLst>
   </p:cSld>

</xml_diff>